<commit_message>
Further work on async storage API - revised callback signature to be much simpler and updated work so far to reflect that Implementations are still incomplete, untested and unbuildable
Affects Issue [68]
</commit_message>
<xml_diff>
--- a/Slides/SemTech West 2012 Conference Presentation.pptx
+++ b/Slides/SemTech West 2012 Conference Presentation.pptx
@@ -5,10 +5,10 @@
     <p:sldMasterId id="2147483927" r:id="rId1"/>
   </p:sldMasterIdLst>
   <p:notesMasterIdLst>
-    <p:notesMasterId r:id="rId10"/>
+    <p:notesMasterId r:id="rId12"/>
   </p:notesMasterIdLst>
   <p:handoutMasterIdLst>
-    <p:handoutMasterId r:id="rId11"/>
+    <p:handoutMasterId r:id="rId13"/>
   </p:handoutMasterIdLst>
   <p:sldIdLst>
     <p:sldId id="367" r:id="rId2"/>
@@ -19,6 +19,8 @@
     <p:sldId id="372" r:id="rId7"/>
     <p:sldId id="375" r:id="rId8"/>
     <p:sldId id="376" r:id="rId9"/>
+    <p:sldId id="377" r:id="rId10"/>
+    <p:sldId id="378" r:id="rId11"/>
   </p:sldIdLst>
   <p:sldSz cx="9144000" cy="6858000" type="letter"/>
   <p:notesSz cx="6950075" cy="9236075"/>
@@ -233,7 +235,7 @@
             <a:fld id="{D4A1D733-05F0-427A-BB00-1B0160BD5054}" type="datetimeFigureOut">
               <a:rPr lang="en-US" smtClean="0"/>
               <a:pPr/>
-              <a:t>4/16/2012</a:t>
+              <a:t>4/23/2012</a:t>
             </a:fld>
             <a:endParaRPr lang="en-US"/>
           </a:p>
@@ -400,7 +402,7 @@
             <a:fld id="{44016A93-A98D-354F-9CDC-CB7C878AEC78}" type="datetimeFigureOut">
               <a:rPr lang="en-US" smtClean="0"/>
               <a:pPr/>
-              <a:t>4/16/2012</a:t>
+              <a:t>4/23/2012</a:t>
             </a:fld>
             <a:endParaRPr lang="en-US"/>
           </a:p>
@@ -2147,6 +2149,81 @@
 </p:sld>
 </file>
 
+<file path=ppt/slides/slide10.xml><?xml version="1.0" encoding="utf-8"?>
+<p:sld xmlns:a="http://schemas.openxmlformats.org/drawingml/2006/main" xmlns:r="http://schemas.openxmlformats.org/officeDocument/2006/relationships" xmlns:p="http://schemas.openxmlformats.org/presentationml/2006/main">
+  <p:cSld>
+    <p:spTree>
+      <p:nvGrpSpPr>
+        <p:cNvPr id="1" name=""/>
+        <p:cNvGrpSpPr/>
+        <p:nvPr/>
+      </p:nvGrpSpPr>
+      <p:grpSpPr>
+        <a:xfrm>
+          <a:off x="0" y="0"/>
+          <a:ext cx="0" cy="0"/>
+          <a:chOff x="0" y="0"/>
+          <a:chExt cx="0" cy="0"/>
+        </a:xfrm>
+      </p:grpSpPr>
+      <p:sp>
+        <p:nvSpPr>
+          <p:cNvPr id="2" name="Title 1"/>
+          <p:cNvSpPr>
+            <a:spLocks noGrp="1"/>
+          </p:cNvSpPr>
+          <p:nvPr>
+            <p:ph type="title"/>
+          </p:nvPr>
+        </p:nvSpPr>
+        <p:spPr/>
+        <p:txBody>
+          <a:bodyPr/>
+          <a:lstStyle/>
+          <a:p>
+            <a:r>
+              <a:rPr lang="en-US" dirty="0" smtClean="0"/>
+              <a:t>Example Results – Query Runtimes</a:t>
+            </a:r>
+            <a:endParaRPr lang="en-US" dirty="0"/>
+          </a:p>
+        </p:txBody>
+      </p:sp>
+      <p:sp>
+        <p:nvSpPr>
+          <p:cNvPr id="3" name="Content Placeholder 2"/>
+          <p:cNvSpPr>
+            <a:spLocks noGrp="1"/>
+          </p:cNvSpPr>
+          <p:nvPr>
+            <p:ph idx="1"/>
+          </p:nvPr>
+        </p:nvSpPr>
+        <p:spPr/>
+        <p:txBody>
+          <a:bodyPr/>
+          <a:lstStyle/>
+          <a:p>
+            <a:endParaRPr lang="en-US"/>
+          </a:p>
+        </p:txBody>
+      </p:sp>
+    </p:spTree>
+    <p:extLst>
+      <p:ext uri="{BB962C8B-B14F-4D97-AF65-F5344CB8AC3E}">
+        <p14:creationId xmlns:p14="http://schemas.microsoft.com/office/powerpoint/2010/main" val="797267181"/>
+      </p:ext>
+    </p:extLst>
+  </p:cSld>
+  <p:clrMapOvr>
+    <a:masterClrMapping/>
+  </p:clrMapOvr>
+  <p:transition>
+    <p:fade/>
+  </p:transition>
+</p:sld>
+</file>
+
 <file path=ppt/slides/slide2.xml><?xml version="1.0" encoding="utf-8"?>
 <p:sld xmlns:a="http://schemas.openxmlformats.org/drawingml/2006/main" xmlns:r="http://schemas.openxmlformats.org/officeDocument/2006/relationships" xmlns:p="http://schemas.openxmlformats.org/presentationml/2006/main">
   <p:cSld>
@@ -3032,41 +3109,50 @@
           <a:p>
             <a:r>
               <a:rPr lang="en-US" dirty="0" smtClean="0"/>
-              <a:t>Run on a late 2011 MacBook Pro</a:t>
+              <a:t>Run on </a:t>
+            </a:r>
+            <a:r>
+              <a:rPr lang="en-US" dirty="0" smtClean="0"/>
+              <a:t>following systems</a:t>
             </a:r>
           </a:p>
           <a:p>
             <a:pPr lvl="1"/>
             <a:r>
               <a:rPr lang="en-US" dirty="0" smtClean="0"/>
-              <a:t>Quad Core</a:t>
+              <a:t>*nix based stores run on late 2011 Mac Book Pro (quad core, 8GB RAM, SSD)</a:t>
+            </a:r>
+          </a:p>
+          <a:p>
+            <a:pPr lvl="2"/>
+            <a:r>
+              <a:rPr lang="en-US" dirty="0" smtClean="0"/>
+              <a:t>Java heap space set to 4GB</a:t>
             </a:r>
           </a:p>
           <a:p>
             <a:pPr lvl="1"/>
             <a:r>
               <a:rPr lang="en-US" dirty="0" smtClean="0"/>
-              <a:t>8GB RAM</a:t>
+              <a:t>Windows based stores run on HP Laptop (dual core, 4GB RAM, HDD)</a:t>
             </a:r>
           </a:p>
           <a:p>
             <a:pPr lvl="1"/>
             <a:r>
               <a:rPr lang="en-US" dirty="0" smtClean="0"/>
-              <a:t>SSD</a:t>
-            </a:r>
-          </a:p>
-          <a:p>
-            <a:pPr lvl="1"/>
-            <a:r>
-              <a:rPr lang="en-US" dirty="0" smtClean="0"/>
-              <a:t>All non-essential programs shutdown during benchmarking</a:t>
-            </a:r>
-          </a:p>
-          <a:p>
-            <a:r>
-              <a:rPr lang="en-US" dirty="0" smtClean="0"/>
-              <a:t>Benchmarked Stores</a:t>
+              <a:t>Both low powered systems compared to servers</a:t>
+            </a:r>
+            <a:endParaRPr lang="en-US" dirty="0"/>
+          </a:p>
+          <a:p>
+            <a:r>
+              <a:rPr lang="en-US" dirty="0" smtClean="0"/>
+              <a:t>Benchmarked </a:t>
+            </a:r>
+            <a:r>
+              <a:rPr lang="en-US" dirty="0" smtClean="0"/>
+              <a:t>Stores</a:t>
             </a:r>
           </a:p>
           <a:p>
@@ -3084,25 +3170,53 @@
             </a:r>
             <a:r>
               <a:rPr lang="en-US" dirty="0" smtClean="0"/>
-              <a:t> 0.9.3</a:t>
-            </a:r>
+              <a:t> </a:t>
+            </a:r>
+            <a:r>
+              <a:rPr lang="en-US" dirty="0" smtClean="0"/>
+              <a:t>0.9.4 (Disk and </a:t>
+            </a:r>
+            <a:r>
+              <a:rPr lang="en-US" smtClean="0"/>
+              <a:t>Memory stores)</a:t>
+            </a:r>
+            <a:endParaRPr lang="en-US" dirty="0" smtClean="0"/>
           </a:p>
           <a:p>
             <a:pPr lvl="1"/>
             <a:r>
               <a:rPr lang="en-US" dirty="0" smtClean="0"/>
-              <a:t>Sesame 2.6.4 (Native Store)</a:t>
+              <a:t>Sesame </a:t>
+            </a:r>
+            <a:r>
+              <a:rPr lang="en-US" dirty="0" smtClean="0"/>
+              <a:t>2.6.5 </a:t>
+            </a:r>
+            <a:r>
+              <a:rPr lang="en-US" dirty="0" smtClean="0"/>
+              <a:t>(Native Store)</a:t>
             </a:r>
           </a:p>
           <a:p>
             <a:pPr lvl="1"/>
             <a:r>
               <a:rPr lang="en-US" dirty="0" smtClean="0"/>
-              <a:t>Virtuoso 6.1.5 (Open </a:t>
-            </a:r>
-            <a:r>
-              <a:rPr lang="en-US" smtClean="0"/>
-              <a:t>Source Edition)</a:t>
+              <a:t>Virtuoso 6.1.5 (Open Source Edition</a:t>
+            </a:r>
+            <a:r>
+              <a:rPr lang="en-US" dirty="0" smtClean="0"/>
+              <a:t>)</a:t>
+            </a:r>
+          </a:p>
+          <a:p>
+            <a:pPr lvl="1"/>
+            <a:r>
+              <a:rPr lang="en-US" dirty="0" err="1" smtClean="0"/>
+              <a:t>dotNetRDF</a:t>
+            </a:r>
+            <a:r>
+              <a:rPr lang="en-US" dirty="0" smtClean="0"/>
+              <a:t> (In-Memory)</a:t>
             </a:r>
             <a:endParaRPr lang="en-US" dirty="0"/>
           </a:p>
@@ -3112,6 +3226,85 @@
     <p:extLst>
       <p:ext uri="{BB962C8B-B14F-4D97-AF65-F5344CB8AC3E}">
         <p14:creationId xmlns:p14="http://schemas.microsoft.com/office/powerpoint/2010/main" val="1079105204"/>
+      </p:ext>
+    </p:extLst>
+  </p:cSld>
+  <p:clrMapOvr>
+    <a:masterClrMapping/>
+  </p:clrMapOvr>
+  <p:transition>
+    <p:fade/>
+  </p:transition>
+</p:sld>
+</file>
+
+<file path=ppt/slides/slide9.xml><?xml version="1.0" encoding="utf-8"?>
+<p:sld xmlns:a="http://schemas.openxmlformats.org/drawingml/2006/main" xmlns:r="http://schemas.openxmlformats.org/officeDocument/2006/relationships" xmlns:p="http://schemas.openxmlformats.org/presentationml/2006/main">
+  <p:cSld>
+    <p:spTree>
+      <p:nvGrpSpPr>
+        <p:cNvPr id="1" name=""/>
+        <p:cNvGrpSpPr/>
+        <p:nvPr/>
+      </p:nvGrpSpPr>
+      <p:grpSpPr>
+        <a:xfrm>
+          <a:off x="0" y="0"/>
+          <a:ext cx="0" cy="0"/>
+          <a:chOff x="0" y="0"/>
+          <a:chExt cx="0" cy="0"/>
+        </a:xfrm>
+      </p:grpSpPr>
+      <p:sp>
+        <p:nvSpPr>
+          <p:cNvPr id="2" name="Title 1"/>
+          <p:cNvSpPr>
+            <a:spLocks noGrp="1"/>
+          </p:cNvSpPr>
+          <p:nvPr>
+            <p:ph type="title"/>
+          </p:nvPr>
+        </p:nvSpPr>
+        <p:spPr/>
+        <p:txBody>
+          <a:bodyPr/>
+          <a:lstStyle/>
+          <a:p>
+            <a:r>
+              <a:rPr lang="en-US" dirty="0" smtClean="0"/>
+              <a:t>Example Results – </a:t>
+            </a:r>
+            <a:r>
+              <a:rPr lang="en-US" dirty="0" err="1" smtClean="0"/>
+              <a:t>QMpH</a:t>
+            </a:r>
+            <a:endParaRPr lang="en-US" dirty="0"/>
+          </a:p>
+        </p:txBody>
+      </p:sp>
+      <p:sp>
+        <p:nvSpPr>
+          <p:cNvPr id="3" name="Content Placeholder 2"/>
+          <p:cNvSpPr>
+            <a:spLocks noGrp="1"/>
+          </p:cNvSpPr>
+          <p:nvPr>
+            <p:ph idx="1"/>
+          </p:nvPr>
+        </p:nvSpPr>
+        <p:spPr/>
+        <p:txBody>
+          <a:bodyPr/>
+          <a:lstStyle/>
+          <a:p>
+            <a:endParaRPr lang="en-US"/>
+          </a:p>
+        </p:txBody>
+      </p:sp>
+    </p:spTree>
+    <p:extLst>
+      <p:ext uri="{BB962C8B-B14F-4D97-AF65-F5344CB8AC3E}">
+        <p14:creationId xmlns:p14="http://schemas.microsoft.com/office/powerpoint/2010/main" val="1721228897"/>
       </p:ext>
     </p:extLst>
   </p:cSld>

</xml_diff>

<commit_message>
Implemented most of the async storage API for Stardog - bar UpdateGraph() Some refactoring around class hierarchy to separate HTTP proxying support out from async HTTP base implementation
Affects Issue [68]
</commit_message>
<xml_diff>
--- a/Slides/SemTech West 2012 Conference Presentation.pptx
+++ b/Slides/SemTech West 2012 Conference Presentation.pptx
@@ -5,10 +5,10 @@
     <p:sldMasterId id="2147483927" r:id="rId1"/>
   </p:sldMasterIdLst>
   <p:notesMasterIdLst>
-    <p:notesMasterId r:id="rId12"/>
+    <p:notesMasterId r:id="rId15"/>
   </p:notesMasterIdLst>
   <p:handoutMasterIdLst>
-    <p:handoutMasterId r:id="rId13"/>
+    <p:handoutMasterId r:id="rId16"/>
   </p:handoutMasterIdLst>
   <p:sldIdLst>
     <p:sldId id="367" r:id="rId2"/>
@@ -20,7 +20,10 @@
     <p:sldId id="375" r:id="rId8"/>
     <p:sldId id="376" r:id="rId9"/>
     <p:sldId id="377" r:id="rId10"/>
-    <p:sldId id="378" r:id="rId11"/>
+    <p:sldId id="379" r:id="rId11"/>
+    <p:sldId id="378" r:id="rId12"/>
+    <p:sldId id="381" r:id="rId13"/>
+    <p:sldId id="380" r:id="rId14"/>
   </p:sldIdLst>
   <p:sldSz cx="9144000" cy="6858000" type="letter"/>
   <p:notesSz cx="6950075" cy="9236075"/>
@@ -235,7 +238,7 @@
             <a:fld id="{D4A1D733-05F0-427A-BB00-1B0160BD5054}" type="datetimeFigureOut">
               <a:rPr lang="en-US" smtClean="0"/>
               <a:pPr/>
-              <a:t>4/23/2012</a:t>
+              <a:t>4/27/2012</a:t>
             </a:fld>
             <a:endParaRPr lang="en-US"/>
           </a:p>
@@ -402,7 +405,7 @@
             <a:fld id="{44016A93-A98D-354F-9CDC-CB7C878AEC78}" type="datetimeFigureOut">
               <a:rPr lang="en-US" smtClean="0"/>
               <a:pPr/>
-              <a:t>4/23/2012</a:t>
+              <a:t>4/27/2012</a:t>
             </a:fld>
             <a:endParaRPr lang="en-US"/>
           </a:p>
@@ -2183,7 +2186,7 @@
           <a:p>
             <a:r>
               <a:rPr lang="en-US" dirty="0" smtClean="0"/>
-              <a:t>Example Results – Query Runtimes</a:t>
+              <a:t>Example Results – Average Mix Runtime</a:t>
             </a:r>
             <a:endParaRPr lang="en-US" dirty="0"/>
           </a:p>
@@ -2211,7 +2214,240 @@
     </p:spTree>
     <p:extLst>
       <p:ext uri="{BB962C8B-B14F-4D97-AF65-F5344CB8AC3E}">
+        <p14:creationId xmlns:p14="http://schemas.microsoft.com/office/powerpoint/2010/main" val="217468073"/>
+      </p:ext>
+    </p:extLst>
+  </p:cSld>
+  <p:clrMapOvr>
+    <a:masterClrMapping/>
+  </p:clrMapOvr>
+  <p:transition>
+    <p:fade/>
+  </p:transition>
+</p:sld>
+</file>
+
+<file path=ppt/slides/slide11.xml><?xml version="1.0" encoding="utf-8"?>
+<p:sld xmlns:a="http://schemas.openxmlformats.org/drawingml/2006/main" xmlns:r="http://schemas.openxmlformats.org/officeDocument/2006/relationships" xmlns:p="http://schemas.openxmlformats.org/presentationml/2006/main">
+  <p:cSld>
+    <p:spTree>
+      <p:nvGrpSpPr>
+        <p:cNvPr id="1" name=""/>
+        <p:cNvGrpSpPr/>
+        <p:nvPr/>
+      </p:nvGrpSpPr>
+      <p:grpSpPr>
+        <a:xfrm>
+          <a:off x="0" y="0"/>
+          <a:ext cx="0" cy="0"/>
+          <a:chOff x="0" y="0"/>
+          <a:chExt cx="0" cy="0"/>
+        </a:xfrm>
+      </p:grpSpPr>
+      <p:sp>
+        <p:nvSpPr>
+          <p:cNvPr id="2" name="Title 1"/>
+          <p:cNvSpPr>
+            <a:spLocks noGrp="1"/>
+          </p:cNvSpPr>
+          <p:nvPr>
+            <p:ph type="title"/>
+          </p:nvPr>
+        </p:nvSpPr>
+        <p:spPr/>
+        <p:txBody>
+          <a:bodyPr/>
+          <a:lstStyle/>
+          <a:p>
+            <a:r>
+              <a:rPr lang="en-US" dirty="0" smtClean="0"/>
+              <a:t>Example Results – Query Runtimes</a:t>
+            </a:r>
+            <a:endParaRPr lang="en-US" dirty="0"/>
+          </a:p>
+        </p:txBody>
+      </p:sp>
+      <p:sp>
+        <p:nvSpPr>
+          <p:cNvPr id="3" name="Content Placeholder 2"/>
+          <p:cNvSpPr>
+            <a:spLocks noGrp="1"/>
+          </p:cNvSpPr>
+          <p:nvPr>
+            <p:ph idx="1"/>
+          </p:nvPr>
+        </p:nvSpPr>
+        <p:spPr/>
+        <p:txBody>
+          <a:bodyPr/>
+          <a:lstStyle/>
+          <a:p>
+            <a:endParaRPr lang="en-US"/>
+          </a:p>
+        </p:txBody>
+      </p:sp>
+    </p:spTree>
+    <p:extLst>
+      <p:ext uri="{BB962C8B-B14F-4D97-AF65-F5344CB8AC3E}">
         <p14:creationId xmlns:p14="http://schemas.microsoft.com/office/powerpoint/2010/main" val="797267181"/>
+      </p:ext>
+    </p:extLst>
+  </p:cSld>
+  <p:clrMapOvr>
+    <a:masterClrMapping/>
+  </p:clrMapOvr>
+  <p:transition>
+    <p:fade/>
+  </p:transition>
+</p:sld>
+</file>
+
+<file path=ppt/slides/slide12.xml><?xml version="1.0" encoding="utf-8"?>
+<p:sld xmlns:a="http://schemas.openxmlformats.org/drawingml/2006/main" xmlns:r="http://schemas.openxmlformats.org/officeDocument/2006/relationships" xmlns:p="http://schemas.openxmlformats.org/presentationml/2006/main">
+  <p:cSld>
+    <p:spTree>
+      <p:nvGrpSpPr>
+        <p:cNvPr id="1" name=""/>
+        <p:cNvGrpSpPr/>
+        <p:nvPr/>
+      </p:nvGrpSpPr>
+      <p:grpSpPr>
+        <a:xfrm>
+          <a:off x="0" y="0"/>
+          <a:ext cx="0" cy="0"/>
+          <a:chOff x="0" y="0"/>
+          <a:chExt cx="0" cy="0"/>
+        </a:xfrm>
+      </p:grpSpPr>
+      <p:sp>
+        <p:nvSpPr>
+          <p:cNvPr id="2" name="Title 1"/>
+          <p:cNvSpPr>
+            <a:spLocks noGrp="1"/>
+          </p:cNvSpPr>
+          <p:nvPr>
+            <p:ph type="title"/>
+          </p:nvPr>
+        </p:nvSpPr>
+        <p:spPr/>
+        <p:txBody>
+          <a:bodyPr/>
+          <a:lstStyle/>
+          <a:p>
+            <a:r>
+              <a:rPr lang="en-US" dirty="0" smtClean="0"/>
+              <a:t>Code &amp; Example Results</a:t>
+            </a:r>
+            <a:endParaRPr lang="en-US" dirty="0"/>
+          </a:p>
+        </p:txBody>
+      </p:sp>
+      <p:sp>
+        <p:nvSpPr>
+          <p:cNvPr id="3" name="Content Placeholder 2"/>
+          <p:cNvSpPr>
+            <a:spLocks noGrp="1"/>
+          </p:cNvSpPr>
+          <p:nvPr>
+            <p:ph idx="1"/>
+          </p:nvPr>
+        </p:nvSpPr>
+        <p:spPr/>
+        <p:txBody>
+          <a:bodyPr/>
+          <a:lstStyle/>
+          <a:p>
+            <a:r>
+              <a:rPr lang="en-US" dirty="0" smtClean="0"/>
+              <a:t>Currently undergoing Legal and IP Clearance</a:t>
+            </a:r>
+          </a:p>
+          <a:p>
+            <a:r>
+              <a:rPr lang="en-US" dirty="0" smtClean="0"/>
+              <a:t>Should be open sourced shortly</a:t>
+            </a:r>
+          </a:p>
+          <a:p>
+            <a:pPr lvl="1"/>
+            <a:r>
+              <a:rPr lang="en-US" dirty="0" smtClean="0"/>
+              <a:t>Apologies this isn’t yet available at time of writing</a:t>
+            </a:r>
+          </a:p>
+          <a:p>
+            <a:r>
+              <a:rPr lang="en-US" dirty="0" smtClean="0"/>
+              <a:t>Example Results </a:t>
+            </a:r>
+            <a:r>
+              <a:rPr lang="en-US" smtClean="0"/>
+              <a:t>data available from TBC</a:t>
+            </a:r>
+            <a:endParaRPr lang="en-US" dirty="0"/>
+          </a:p>
+        </p:txBody>
+      </p:sp>
+    </p:spTree>
+    <p:extLst>
+      <p:ext uri="{BB962C8B-B14F-4D97-AF65-F5344CB8AC3E}">
+        <p14:creationId xmlns:p14="http://schemas.microsoft.com/office/powerpoint/2010/main" val="37008486"/>
+      </p:ext>
+    </p:extLst>
+  </p:cSld>
+  <p:clrMapOvr>
+    <a:masterClrMapping/>
+  </p:clrMapOvr>
+  <p:transition>
+    <p:fade/>
+  </p:transition>
+</p:sld>
+</file>
+
+<file path=ppt/slides/slide13.xml><?xml version="1.0" encoding="utf-8"?>
+<p:sld xmlns:a="http://schemas.openxmlformats.org/drawingml/2006/main" xmlns:r="http://schemas.openxmlformats.org/officeDocument/2006/relationships" xmlns:p="http://schemas.openxmlformats.org/presentationml/2006/main">
+  <p:cSld>
+    <p:spTree>
+      <p:nvGrpSpPr>
+        <p:cNvPr id="1" name=""/>
+        <p:cNvGrpSpPr/>
+        <p:nvPr/>
+      </p:nvGrpSpPr>
+      <p:grpSpPr>
+        <a:xfrm>
+          <a:off x="0" y="0"/>
+          <a:ext cx="0" cy="0"/>
+          <a:chOff x="0" y="0"/>
+          <a:chExt cx="0" cy="0"/>
+        </a:xfrm>
+      </p:grpSpPr>
+      <p:sp>
+        <p:nvSpPr>
+          <p:cNvPr id="4" name="Title 3"/>
+          <p:cNvSpPr>
+            <a:spLocks noGrp="1"/>
+          </p:cNvSpPr>
+          <p:nvPr>
+            <p:ph type="title"/>
+          </p:nvPr>
+        </p:nvSpPr>
+        <p:spPr/>
+        <p:txBody>
+          <a:bodyPr/>
+          <a:lstStyle/>
+          <a:p>
+            <a:r>
+              <a:rPr lang="en-US" dirty="0" smtClean="0"/>
+              <a:t>Questions?</a:t>
+            </a:r>
+            <a:endParaRPr lang="en-US" dirty="0"/>
+          </a:p>
+        </p:txBody>
+      </p:sp>
+    </p:spTree>
+    <p:extLst>
+      <p:ext uri="{BB962C8B-B14F-4D97-AF65-F5344CB8AC3E}">
+        <p14:creationId xmlns:p14="http://schemas.microsoft.com/office/powerpoint/2010/main" val="2829355471"/>
       </p:ext>
     </p:extLst>
   </p:cSld>
@@ -3084,36 +3320,48 @@
         </p:nvSpPr>
         <p:spPr/>
         <p:txBody>
-          <a:bodyPr/>
+          <a:bodyPr>
+            <a:normAutofit lnSpcReduction="10000"/>
+          </a:bodyPr>
           <a:lstStyle/>
           <a:p>
             <a:r>
               <a:rPr lang="en-US" dirty="0" smtClean="0"/>
-              <a:t>SP2B at 10k, 50k and 250k run with 5 warm-ups and 25 runs</a:t>
-            </a:r>
+              <a:t>SP2B at 10k, 50k and 250k run with 5 warm-ups and 25 </a:t>
+            </a:r>
+            <a:r>
+              <a:rPr lang="en-US" dirty="0" smtClean="0"/>
+              <a:t>runs </a:t>
+            </a:r>
+            <a:endParaRPr lang="en-US" dirty="0" smtClean="0"/>
           </a:p>
           <a:p>
             <a:pPr lvl="1"/>
             <a:r>
               <a:rPr lang="en-US" dirty="0" smtClean="0"/>
-              <a:t>Using SPARQL TSV as result format</a:t>
+              <a:t>All </a:t>
+            </a:r>
+            <a:r>
+              <a:rPr lang="en-US" dirty="0" smtClean="0"/>
+              <a:t>options left as defaults i.e. full result </a:t>
+            </a:r>
+            <a:r>
+              <a:rPr lang="en-US" dirty="0" smtClean="0"/>
+              <a:t>counting</a:t>
             </a:r>
           </a:p>
           <a:p>
             <a:pPr lvl="1"/>
             <a:r>
               <a:rPr lang="en-US" dirty="0" smtClean="0"/>
-              <a:t>All options left as defaults i.e. full result counting</a:t>
-            </a:r>
-          </a:p>
-          <a:p>
-            <a:r>
-              <a:rPr lang="en-US" dirty="0" smtClean="0"/>
-              <a:t>Run on </a:t>
-            </a:r>
-            <a:r>
-              <a:rPr lang="en-US" dirty="0" smtClean="0"/>
-              <a:t>following systems</a:t>
+              <a:t>Runs for 250k skipped if store was incapable of performing the run in reasonable time</a:t>
+            </a:r>
+            <a:endParaRPr lang="en-US" dirty="0" smtClean="0"/>
+          </a:p>
+          <a:p>
+            <a:r>
+              <a:rPr lang="en-US" dirty="0" smtClean="0"/>
+              <a:t>Run on following systems</a:t>
             </a:r>
           </a:p>
           <a:p>
@@ -3148,11 +3396,7 @@
           <a:p>
             <a:r>
               <a:rPr lang="en-US" dirty="0" smtClean="0"/>
-              <a:t>Benchmarked </a:t>
-            </a:r>
-            <a:r>
-              <a:rPr lang="en-US" dirty="0" smtClean="0"/>
-              <a:t>Stores</a:t>
+              <a:t>Benchmarked Stores</a:t>
             </a:r>
           </a:p>
           <a:p>
@@ -3165,20 +3409,42 @@
           <a:p>
             <a:pPr lvl="1"/>
             <a:r>
+              <a:rPr lang="en-US" dirty="0" smtClean="0"/>
+              <a:t>Sesame </a:t>
+            </a:r>
+            <a:r>
+              <a:rPr lang="en-US" dirty="0" smtClean="0"/>
+              <a:t>2.6.5 </a:t>
+            </a:r>
+            <a:r>
+              <a:rPr lang="en-US" dirty="0" smtClean="0"/>
+              <a:t>(Memory and Native </a:t>
+            </a:r>
+            <a:r>
+              <a:rPr lang="en-US" dirty="0" smtClean="0"/>
+              <a:t>Store</a:t>
+            </a:r>
+            <a:r>
+              <a:rPr lang="en-US" dirty="0" smtClean="0"/>
+              <a:t>)</a:t>
+            </a:r>
+          </a:p>
+          <a:p>
+            <a:pPr lvl="1"/>
+            <a:r>
               <a:rPr lang="en-US" dirty="0" err="1" smtClean="0"/>
-              <a:t>Stardog</a:t>
-            </a:r>
-            <a:r>
-              <a:rPr lang="en-US" dirty="0" smtClean="0"/>
-              <a:t> </a:t>
-            </a:r>
-            <a:r>
-              <a:rPr lang="en-US" dirty="0" smtClean="0"/>
-              <a:t>0.9.4 (Disk and </a:t>
-            </a:r>
-            <a:r>
-              <a:rPr lang="en-US" smtClean="0"/>
-              <a:t>Memory stores)</a:t>
+              <a:t>Bigdata</a:t>
+            </a:r>
+            <a:r>
+              <a:rPr lang="en-US" dirty="0" smtClean="0"/>
+              <a:t> 1.2 (WORM Store)</a:t>
+            </a:r>
+          </a:p>
+          <a:p>
+            <a:pPr lvl="1"/>
+            <a:r>
+              <a:rPr lang="en-US" dirty="0" err="1" smtClean="0"/>
+              <a:t>Dydra</a:t>
             </a:r>
             <a:endParaRPr lang="en-US" dirty="0" smtClean="0"/>
           </a:p>
@@ -3186,26 +3452,7 @@
             <a:pPr lvl="1"/>
             <a:r>
               <a:rPr lang="en-US" dirty="0" smtClean="0"/>
-              <a:t>Sesame </a:t>
-            </a:r>
-            <a:r>
-              <a:rPr lang="en-US" dirty="0" smtClean="0"/>
-              <a:t>2.6.5 </a:t>
-            </a:r>
-            <a:r>
-              <a:rPr lang="en-US" dirty="0" smtClean="0"/>
-              <a:t>(Native Store)</a:t>
-            </a:r>
-          </a:p>
-          <a:p>
-            <a:pPr lvl="1"/>
-            <a:r>
-              <a:rPr lang="en-US" dirty="0" smtClean="0"/>
-              <a:t>Virtuoso 6.1.5 (Open Source Edition</a:t>
-            </a:r>
-            <a:r>
-              <a:rPr lang="en-US" dirty="0" smtClean="0"/>
-              <a:t>)</a:t>
+              <a:t>Virtuoso 6.1.5 (Open Source Edition)</a:t>
             </a:r>
           </a:p>
           <a:p>
@@ -3216,9 +3463,12 @@
             </a:r>
             <a:r>
               <a:rPr lang="en-US" dirty="0" smtClean="0"/>
-              <a:t> (In-Memory)</a:t>
-            </a:r>
-            <a:endParaRPr lang="en-US" dirty="0"/>
+              <a:t> (</a:t>
+            </a:r>
+            <a:r>
+              <a:rPr lang="en-US" dirty="0" smtClean="0"/>
+              <a:t>In-Memory Store)</a:t>
+            </a:r>
           </a:p>
         </p:txBody>
       </p:sp>
@@ -3297,7 +3547,7 @@
           <a:bodyPr/>
           <a:lstStyle/>
           <a:p>
-            <a:endParaRPr lang="en-US"/>
+            <a:endParaRPr lang="en-US" dirty="0"/>
           </a:p>
         </p:txBody>
       </p:sp>

</xml_diff>

<commit_message>
Updated version of SemTech presentation
</commit_message>
<xml_diff>
--- a/Slides/SemTech West 2012 Conference Presentation.pptx
+++ b/Slides/SemTech West 2012 Conference Presentation.pptx
@@ -238,7 +238,7 @@
             <a:fld id="{D4A1D733-05F0-427A-BB00-1B0160BD5054}" type="datetimeFigureOut">
               <a:rPr lang="en-US" smtClean="0"/>
               <a:pPr/>
-              <a:t>4/27/2012</a:t>
+              <a:t>5/4/2012</a:t>
             </a:fld>
             <a:endParaRPr lang="en-US"/>
           </a:p>
@@ -405,7 +405,7 @@
             <a:fld id="{44016A93-A98D-354F-9CDC-CB7C878AEC78}" type="datetimeFigureOut">
               <a:rPr lang="en-US" smtClean="0"/>
               <a:pPr/>
-              <a:t>4/27/2012</a:t>
+              <a:t>5/4/2012</a:t>
             </a:fld>
             <a:endParaRPr lang="en-US"/>
           </a:p>
@@ -2192,25 +2192,35 @@
           </a:p>
         </p:txBody>
       </p:sp>
-      <p:sp>
-        <p:nvSpPr>
-          <p:cNvPr id="3" name="Content Placeholder 2"/>
-          <p:cNvSpPr>
-            <a:spLocks noGrp="1"/>
-          </p:cNvSpPr>
+      <p:pic>
+        <p:nvPicPr>
+          <p:cNvPr id="4" name="Content Placeholder 3"/>
+          <p:cNvPicPr>
+            <a:picLocks noGrp="1" noChangeAspect="1"/>
+          </p:cNvPicPr>
           <p:nvPr>
             <p:ph idx="1"/>
           </p:nvPr>
-        </p:nvSpPr>
-        <p:spPr/>
-        <p:txBody>
-          <a:bodyPr/>
-          <a:lstStyle/>
-          <a:p>
-            <a:endParaRPr lang="en-US"/>
-          </a:p>
-        </p:txBody>
-      </p:sp>
+        </p:nvPicPr>
+        <p:blipFill>
+          <a:blip r:embed="rId2">
+            <a:extLst>
+              <a:ext uri="{28A0092B-C50C-407E-A947-70E740481C1C}">
+                <a14:useLocalDpi xmlns:a14="http://schemas.microsoft.com/office/drawing/2010/main" val="0"/>
+              </a:ext>
+            </a:extLst>
+          </a:blip>
+          <a:stretch>
+            <a:fillRect/>
+          </a:stretch>
+        </p:blipFill>
+        <p:spPr>
+          <a:xfrm>
+            <a:off x="152400" y="914400"/>
+            <a:ext cx="8755410" cy="5121275"/>
+          </a:xfrm>
+        </p:spPr>
+      </p:pic>
     </p:spTree>
     <p:extLst>
       <p:ext uri="{BB962C8B-B14F-4D97-AF65-F5344CB8AC3E}">
@@ -2267,25 +2277,35 @@
           </a:p>
         </p:txBody>
       </p:sp>
-      <p:sp>
-        <p:nvSpPr>
-          <p:cNvPr id="3" name="Content Placeholder 2"/>
-          <p:cNvSpPr>
-            <a:spLocks noGrp="1"/>
-          </p:cNvSpPr>
+      <p:pic>
+        <p:nvPicPr>
+          <p:cNvPr id="4" name="Content Placeholder 3"/>
+          <p:cNvPicPr>
+            <a:picLocks noGrp="1" noChangeAspect="1"/>
+          </p:cNvPicPr>
           <p:nvPr>
             <p:ph idx="1"/>
           </p:nvPr>
-        </p:nvSpPr>
-        <p:spPr/>
-        <p:txBody>
-          <a:bodyPr/>
-          <a:lstStyle/>
-          <a:p>
-            <a:endParaRPr lang="en-US"/>
-          </a:p>
-        </p:txBody>
-      </p:sp>
+        </p:nvPicPr>
+        <p:blipFill>
+          <a:blip r:embed="rId2">
+            <a:extLst>
+              <a:ext uri="{28A0092B-C50C-407E-A947-70E740481C1C}">
+                <a14:useLocalDpi xmlns:a14="http://schemas.microsoft.com/office/drawing/2010/main" val="0"/>
+              </a:ext>
+            </a:extLst>
+          </a:blip>
+          <a:stretch>
+            <a:fillRect/>
+          </a:stretch>
+        </p:blipFill>
+        <p:spPr>
+          <a:xfrm>
+            <a:off x="182563" y="1179325"/>
+            <a:ext cx="8778875" cy="4896225"/>
+          </a:xfrm>
+        </p:spPr>
+      </p:pic>
     </p:spTree>
     <p:extLst>
       <p:ext uri="{BB962C8B-B14F-4D97-AF65-F5344CB8AC3E}">
@@ -2359,10 +2379,22 @@
           <a:p>
             <a:r>
               <a:rPr lang="en-US" dirty="0" smtClean="0"/>
-              <a:t>Currently undergoing Legal and IP Clearance</a:t>
-            </a:r>
-          </a:p>
-          <a:p>
+              <a:t>Code Release is Management Approved</a:t>
+            </a:r>
+          </a:p>
+          <a:p>
+            <a:pPr lvl="1"/>
+            <a:r>
+              <a:rPr lang="en-US" dirty="0" smtClean="0"/>
+              <a:t>Currently </a:t>
+            </a:r>
+            <a:r>
+              <a:rPr lang="en-US" dirty="0" smtClean="0"/>
+              <a:t>undergoing Legal and IP Clearance</a:t>
+            </a:r>
+          </a:p>
+          <a:p>
+            <a:pPr lvl="1"/>
             <a:r>
               <a:rPr lang="en-US" dirty="0" smtClean="0"/>
               <a:t>Should be open sourced shortly</a:t>
@@ -2378,11 +2410,18 @@
           <a:p>
             <a:r>
               <a:rPr lang="en-US" dirty="0" smtClean="0"/>
-              <a:t>Example Results </a:t>
-            </a:r>
-            <a:r>
-              <a:rPr lang="en-US" smtClean="0"/>
-              <a:t>data available from TBC</a:t>
+              <a:t>Example Results data available </a:t>
+            </a:r>
+            <a:r>
+              <a:rPr lang="en-US" dirty="0" smtClean="0"/>
+              <a:t>from:</a:t>
+            </a:r>
+          </a:p>
+          <a:p>
+            <a:pPr lvl="1"/>
+            <a:r>
+              <a:rPr lang="en-US" dirty="0" smtClean="0"/>
+              <a:t>TBC – Will be available on day of presentation</a:t>
             </a:r>
             <a:endParaRPr lang="en-US" dirty="0"/>
           </a:p>
@@ -2539,8 +2578,35 @@
           <a:p>
             <a:r>
               <a:rPr lang="en-US" dirty="0" smtClean="0"/>
-              <a:t>You need to justify option X over option Y</a:t>
-            </a:r>
+              <a:t>You need to justify option X over option </a:t>
+            </a:r>
+            <a:r>
+              <a:rPr lang="en-US" dirty="0" smtClean="0"/>
+              <a:t>Y</a:t>
+            </a:r>
+          </a:p>
+          <a:p>
+            <a:pPr lvl="1"/>
+            <a:r>
+              <a:rPr lang="en-US" dirty="0" smtClean="0"/>
+              <a:t>Business – Price </a:t>
+            </a:r>
+            <a:r>
+              <a:rPr lang="en-US" dirty="0" err="1" smtClean="0"/>
+              <a:t>vs</a:t>
+            </a:r>
+            <a:r>
+              <a:rPr lang="en-US" dirty="0" smtClean="0"/>
+              <a:t> Performance</a:t>
+            </a:r>
+          </a:p>
+          <a:p>
+            <a:pPr lvl="1"/>
+            <a:r>
+              <a:rPr lang="en-US" dirty="0" smtClean="0"/>
+              <a:t>Technical – Does it perform sufficiently?</a:t>
+            </a:r>
+            <a:endParaRPr lang="en-US" dirty="0" smtClean="0"/>
           </a:p>
           <a:p>
             <a:r>
@@ -3321,42 +3387,36 @@
         <p:spPr/>
         <p:txBody>
           <a:bodyPr>
-            <a:normAutofit lnSpcReduction="10000"/>
+            <a:normAutofit fontScale="92500" lnSpcReduction="10000"/>
           </a:bodyPr>
           <a:lstStyle/>
           <a:p>
             <a:r>
               <a:rPr lang="en-US" dirty="0" smtClean="0"/>
-              <a:t>SP2B at 10k, 50k and 250k run with 5 warm-ups and 25 </a:t>
-            </a:r>
-            <a:r>
-              <a:rPr lang="en-US" dirty="0" smtClean="0"/>
-              <a:t>runs </a:t>
-            </a:r>
-            <a:endParaRPr lang="en-US" dirty="0" smtClean="0"/>
-          </a:p>
-          <a:p>
-            <a:pPr lvl="1"/>
-            <a:r>
-              <a:rPr lang="en-US" dirty="0" smtClean="0"/>
-              <a:t>All </a:t>
-            </a:r>
-            <a:r>
-              <a:rPr lang="en-US" dirty="0" smtClean="0"/>
-              <a:t>options left as defaults i.e. full result </a:t>
-            </a:r>
-            <a:r>
-              <a:rPr lang="en-US" dirty="0" smtClean="0"/>
-              <a:t>counting</a:t>
-            </a:r>
-          </a:p>
-          <a:p>
-            <a:pPr lvl="1"/>
-            <a:r>
-              <a:rPr lang="en-US" dirty="0" smtClean="0"/>
-              <a:t>Runs for 250k skipped if store was incapable of performing the run in reasonable time</a:t>
-            </a:r>
-            <a:endParaRPr lang="en-US" dirty="0" smtClean="0"/>
+              <a:t>SP2B at 10k, 50k and 250k run with 5 warm-ups and 25 runs </a:t>
+            </a:r>
+          </a:p>
+          <a:p>
+            <a:pPr lvl="1"/>
+            <a:r>
+              <a:rPr lang="en-US" dirty="0" smtClean="0"/>
+              <a:t>All options left as defaults i.e. full result counting</a:t>
+            </a:r>
+          </a:p>
+          <a:p>
+            <a:pPr lvl="1"/>
+            <a:r>
+              <a:rPr lang="en-US" dirty="0" smtClean="0"/>
+              <a:t>Runs for </a:t>
+            </a:r>
+            <a:r>
+              <a:rPr lang="en-US" dirty="0" smtClean="0"/>
+              <a:t>50k and 250k </a:t>
+            </a:r>
+            <a:r>
+              <a:rPr lang="en-US" dirty="0" smtClean="0"/>
+              <a:t>skipped if store was incapable of performing the run in reasonable time</a:t>
+            </a:r>
           </a:p>
           <a:p>
             <a:r>
@@ -3410,23 +3470,7 @@
             <a:pPr lvl="1"/>
             <a:r>
               <a:rPr lang="en-US" dirty="0" smtClean="0"/>
-              <a:t>Sesame </a:t>
-            </a:r>
-            <a:r>
-              <a:rPr lang="en-US" dirty="0" smtClean="0"/>
-              <a:t>2.6.5 </a:t>
-            </a:r>
-            <a:r>
-              <a:rPr lang="en-US" dirty="0" smtClean="0"/>
-              <a:t>(Memory and Native </a:t>
-            </a:r>
-            <a:r>
-              <a:rPr lang="en-US" dirty="0" smtClean="0"/>
-              <a:t>Store</a:t>
-            </a:r>
-            <a:r>
-              <a:rPr lang="en-US" dirty="0" smtClean="0"/>
-              <a:t>)</a:t>
+              <a:t>Sesame 2.6.5 (Memory and Native Store)</a:t>
             </a:r>
           </a:p>
           <a:p>
@@ -3452,7 +3496,15 @@
             <a:pPr lvl="1"/>
             <a:r>
               <a:rPr lang="en-US" dirty="0" smtClean="0"/>
-              <a:t>Virtuoso 6.1.5 (Open Source Edition)</a:t>
+              <a:t>Virtuoso </a:t>
+            </a:r>
+            <a:r>
+              <a:rPr lang="en-US" dirty="0" smtClean="0"/>
+              <a:t>6.1.3 </a:t>
+            </a:r>
+            <a:r>
+              <a:rPr lang="en-US" dirty="0" smtClean="0"/>
+              <a:t>(Open Source Edition)</a:t>
             </a:r>
           </a:p>
           <a:p>
@@ -3463,12 +3515,20 @@
             </a:r>
             <a:r>
               <a:rPr lang="en-US" dirty="0" smtClean="0"/>
-              <a:t> (</a:t>
-            </a:r>
-            <a:r>
-              <a:rPr lang="en-US" dirty="0" smtClean="0"/>
-              <a:t>In-Memory Store)</a:t>
-            </a:r>
+              <a:t> (In-Memory Store</a:t>
+            </a:r>
+            <a:r>
+              <a:rPr lang="en-US" dirty="0" smtClean="0"/>
+              <a:t>)</a:t>
+            </a:r>
+          </a:p>
+          <a:p>
+            <a:pPr lvl="1"/>
+            <a:r>
+              <a:rPr lang="en-US" dirty="0" smtClean="0"/>
+              <a:t>NB – Final slides may cover more stores subject to time and vendor agreements</a:t>
+            </a:r>
+            <a:endParaRPr lang="en-US" dirty="0" smtClean="0"/>
           </a:p>
         </p:txBody>
       </p:sp>
@@ -3532,25 +3592,36 @@
           </a:p>
         </p:txBody>
       </p:sp>
-      <p:sp>
-        <p:nvSpPr>
-          <p:cNvPr id="3" name="Content Placeholder 2"/>
-          <p:cNvSpPr>
-            <a:spLocks noGrp="1"/>
-          </p:cNvSpPr>
-          <p:nvPr>
-            <p:ph idx="1"/>
-          </p:nvPr>
-        </p:nvSpPr>
-        <p:spPr/>
-        <p:txBody>
-          <a:bodyPr/>
-          <a:lstStyle/>
-          <a:p>
-            <a:endParaRPr lang="en-US" dirty="0"/>
-          </a:p>
-        </p:txBody>
-      </p:sp>
+      <p:pic>
+        <p:nvPicPr>
+          <p:cNvPr id="4" name="Picture 3"/>
+          <p:cNvPicPr>
+            <a:picLocks noChangeAspect="1"/>
+          </p:cNvPicPr>
+          <p:nvPr/>
+        </p:nvPicPr>
+        <p:blipFill>
+          <a:blip r:embed="rId2">
+            <a:extLst>
+              <a:ext uri="{28A0092B-C50C-407E-A947-70E740481C1C}">
+                <a14:useLocalDpi xmlns:a14="http://schemas.microsoft.com/office/drawing/2010/main" val="0"/>
+              </a:ext>
+            </a:extLst>
+          </a:blip>
+          <a:stretch>
+            <a:fillRect/>
+          </a:stretch>
+        </p:blipFill>
+        <p:spPr>
+          <a:xfrm>
+            <a:off x="0" y="947791"/>
+            <a:ext cx="9144000" cy="4962418"/>
+          </a:xfrm>
+          <a:prstGeom prst="rect">
+            <a:avLst/>
+          </a:prstGeom>
+        </p:spPr>
+      </p:pic>
     </p:spTree>
     <p:extLst>
       <p:ext uri="{BB962C8B-B14F-4D97-AF65-F5344CB8AC3E}">

</xml_diff>